<commit_message>
Remove duplicate slide and update list of actions
</commit_message>
<xml_diff>
--- a/ConnectorActionableMsgs/03 Adaptive Cards/02 Card Actions.pptx
+++ b/ConnectorActionableMsgs/03 Adaptive Cards/02 Card Actions.pptx
@@ -5,10 +5,10 @@
     <p:sldMasterId id="2147484229" r:id="rId1"/>
   </p:sldMasterIdLst>
   <p:notesMasterIdLst>
-    <p:notesMasterId r:id="rId14"/>
+    <p:notesMasterId r:id="rId13"/>
   </p:notesMasterIdLst>
   <p:handoutMasterIdLst>
-    <p:handoutMasterId r:id="rId15"/>
+    <p:handoutMasterId r:id="rId14"/>
   </p:handoutMasterIdLst>
   <p:sldIdLst>
     <p:sldId id="257" r:id="rId2"/>
@@ -16,13 +16,12 @@
     <p:sldId id="314" r:id="rId4"/>
     <p:sldId id="313" r:id="rId5"/>
     <p:sldId id="315" r:id="rId6"/>
-    <p:sldId id="308" r:id="rId7"/>
-    <p:sldId id="316" r:id="rId8"/>
-    <p:sldId id="317" r:id="rId9"/>
-    <p:sldId id="265" r:id="rId10"/>
-    <p:sldId id="307" r:id="rId11"/>
-    <p:sldId id="261" r:id="rId12"/>
-    <p:sldId id="260" r:id="rId13"/>
+    <p:sldId id="316" r:id="rId7"/>
+    <p:sldId id="317" r:id="rId8"/>
+    <p:sldId id="265" r:id="rId9"/>
+    <p:sldId id="307" r:id="rId10"/>
+    <p:sldId id="261" r:id="rId11"/>
+    <p:sldId id="260" r:id="rId12"/>
   </p:sldIdLst>
   <p:sldSz cx="12436475" cy="6994525"/>
   <p:notesSz cx="6858000" cy="9144000"/>
@@ -131,7 +130,6 @@
             <p14:sldId id="314"/>
             <p14:sldId id="313"/>
             <p14:sldId id="315"/>
-            <p14:sldId id="308"/>
             <p14:sldId id="316"/>
             <p14:sldId id="317"/>
             <p14:sldId id="265"/>
@@ -259,7 +257,7 @@
               <a:rPr lang="en-US" smtClean="0">
                 <a:latin typeface="Segoe UI" pitchFamily="34" charset="0"/>
               </a:rPr>
-              <a:t>6/6/2018 6:57 PM</a:t>
+              <a:t>12/17/2018 10:38 AM</a:t>
             </a:fld>
             <a:endParaRPr lang="en-US" dirty="0">
               <a:latin typeface="Segoe UI" pitchFamily="34" charset="0"/>
@@ -553,7 +551,7 @@
           <a:p>
             <a:fld id="{D18B56EA-E28F-4F92-9F16-7A6F2501B303}" type="datetime8">
               <a:rPr lang="en-US" smtClean="0"/>
-              <a:t>6/6/2018 6:48 PM</a:t>
+              <a:t>12/17/2018 10:37 AM</a:t>
             </a:fld>
             <a:endParaRPr lang="en-US" dirty="0"/>
           </a:p>
@@ -936,7 +934,7 @@
           <a:p>
             <a:fld id="{D18B56EA-E28F-4F92-9F16-7A6F2501B303}" type="datetime8">
               <a:rPr lang="en-US" smtClean="0"/>
-              <a:t>6/6/2018 6:48 PM</a:t>
+              <a:t>12/17/2018 10:37 AM</a:t>
             </a:fld>
             <a:endParaRPr lang="en-US" dirty="0"/>
           </a:p>
@@ -1222,7 +1220,7 @@
                 <a:tabLst/>
                 <a:defRPr/>
               </a:pPr>
-              <a:t>6/6/2018 6:48 PM</a:t>
+              <a:t>12/17/2018 10:37 AM</a:t>
             </a:fld>
             <a:endParaRPr kumimoji="0" lang="en-US" sz="1200" b="0" i="0" u="none" strike="noStrike" kern="1200" cap="none" spc="0" normalizeH="0" baseline="0" noProof="0" dirty="0">
               <a:ln>
@@ -1381,129 +1379,6 @@
           <a:bodyPr/>
           <a:lstStyle/>
           <a:p>
-            <a:r>
-              <a:rPr lang="en-US" sz="900" b="0" i="0" kern="1200" dirty="0">
-                <a:solidFill>
-                  <a:schemeClr val="tx1"/>
-                </a:solidFill>
-                <a:effectLst/>
-                <a:latin typeface="Segoe UI Light" pitchFamily="34" charset="0"/>
-                <a:ea typeface="+mn-ea"/>
-                <a:cs typeface="+mn-cs"/>
-              </a:rPr>
-              <a:t>Although links can be achieved through Markdown, an </a:t>
-            </a:r>
-            <a:r>
-              <a:rPr lang="en-US" dirty="0" err="1"/>
-              <a:t>OpenUri</a:t>
-            </a:r>
-            <a:r>
-              <a:rPr lang="en-US" sz="900" b="0" i="0" kern="1200" dirty="0">
-                <a:solidFill>
-                  <a:schemeClr val="tx1"/>
-                </a:solidFill>
-                <a:effectLst/>
-                <a:latin typeface="Segoe UI Light" pitchFamily="34" charset="0"/>
-                <a:ea typeface="+mn-ea"/>
-                <a:cs typeface="+mn-cs"/>
-              </a:rPr>
-              <a:t> action has the advantage of allowing you to specify different URIs for different operating systems, which makes it possible to open the link in an app on mobile devices.</a:t>
-            </a:r>
-          </a:p>
-          <a:p>
-            <a:endParaRPr lang="en-US" sz="900" b="0" i="0" kern="1200" dirty="0">
-              <a:solidFill>
-                <a:schemeClr val="tx1"/>
-              </a:solidFill>
-              <a:effectLst/>
-              <a:latin typeface="Segoe UI Light" pitchFamily="34" charset="0"/>
-              <a:ea typeface="+mn-ea"/>
-              <a:cs typeface="+mn-cs"/>
-            </a:endParaRPr>
-          </a:p>
-          <a:p>
-            <a:r>
-              <a:rPr lang="en-US" sz="900" b="0" i="0" kern="1200" dirty="0">
-                <a:solidFill>
-                  <a:schemeClr val="tx1"/>
-                </a:solidFill>
-                <a:effectLst/>
-                <a:latin typeface="Segoe UI Light" pitchFamily="34" charset="0"/>
-                <a:ea typeface="+mn-ea"/>
-                <a:cs typeface="+mn-cs"/>
-              </a:rPr>
-              <a:t>When an </a:t>
-            </a:r>
-            <a:r>
-              <a:rPr lang="en-US" dirty="0" err="1"/>
-              <a:t>HttpPOST</a:t>
-            </a:r>
-            <a:r>
-              <a:rPr lang="en-US" sz="900" b="0" i="0" kern="1200" dirty="0">
-                <a:solidFill>
-                  <a:schemeClr val="tx1"/>
-                </a:solidFill>
-                <a:effectLst/>
-                <a:latin typeface="Segoe UI Light" pitchFamily="34" charset="0"/>
-                <a:ea typeface="+mn-ea"/>
-                <a:cs typeface="+mn-cs"/>
-              </a:rPr>
-              <a:t> action is executed, a POST request is made to the URL in the </a:t>
-            </a:r>
-            <a:r>
-              <a:rPr lang="en-US" dirty="0"/>
-              <a:t>target</a:t>
-            </a:r>
-            <a:r>
-              <a:rPr lang="en-US" sz="900" b="0" i="0" kern="1200" dirty="0">
-                <a:solidFill>
-                  <a:schemeClr val="tx1"/>
-                </a:solidFill>
-                <a:effectLst/>
-                <a:latin typeface="Segoe UI Light" pitchFamily="34" charset="0"/>
-                <a:ea typeface="+mn-ea"/>
-                <a:cs typeface="+mn-cs"/>
-              </a:rPr>
-              <a:t> field, and the target service needs to authenticate the caller. This can be done in a variety of ways, including via a Limited Purpose Token embedded in the target URL. For more information and help on choosing the security mechanism that works best for your particular scenario, please see </a:t>
-            </a:r>
-            <a:r>
-              <a:rPr lang="en-US" sz="900" b="0" i="0" u="sng" kern="1200" dirty="0">
-                <a:solidFill>
-                  <a:schemeClr val="tx1"/>
-                </a:solidFill>
-                <a:effectLst/>
-                <a:latin typeface="Segoe UI Light" pitchFamily="34" charset="0"/>
-                <a:ea typeface="+mn-ea"/>
-                <a:cs typeface="+mn-cs"/>
-                <a:hlinkClick r:id="rId3"/>
-              </a:rPr>
-              <a:t>Security requirements for actionable messages</a:t>
-            </a:r>
-            <a:r>
-              <a:rPr lang="en-US" sz="900" b="0" i="0" kern="1200" dirty="0">
-                <a:solidFill>
-                  <a:schemeClr val="tx1"/>
-                </a:solidFill>
-                <a:effectLst/>
-                <a:latin typeface="Segoe UI Light" pitchFamily="34" charset="0"/>
-                <a:ea typeface="+mn-ea"/>
-                <a:cs typeface="+mn-cs"/>
-              </a:rPr>
-              <a:t>.</a:t>
-            </a:r>
-          </a:p>
-          <a:p>
-            <a:endParaRPr lang="en-US" sz="900" b="0" i="0" kern="1200" dirty="0">
-              <a:solidFill>
-                <a:schemeClr val="tx1"/>
-              </a:solidFill>
-              <a:effectLst/>
-              <a:latin typeface="Segoe UI Light" pitchFamily="34" charset="0"/>
-              <a:ea typeface="+mn-ea"/>
-              <a:cs typeface="+mn-cs"/>
-            </a:endParaRPr>
-          </a:p>
-          <a:p>
             <a:endParaRPr lang="en-US" dirty="0"/>
           </a:p>
         </p:txBody>
@@ -1515,7 +1390,7 @@
             <a:spLocks noGrp="1"/>
           </p:cNvSpPr>
           <p:nvPr>
-            <p:ph type="hdr" sz="quarter" idx="10"/>
+            <p:ph type="hdr" sz="quarter"/>
           </p:nvPr>
         </p:nvSpPr>
         <p:spPr/>
@@ -1534,7 +1409,7 @@
             <a:spLocks noGrp="1"/>
           </p:cNvSpPr>
           <p:nvPr>
-            <p:ph type="ftr" sz="quarter" idx="11"/>
+            <p:ph type="ftr" sz="quarter" idx="4"/>
           </p:nvPr>
         </p:nvSpPr>
         <p:spPr/>
@@ -1588,7 +1463,7 @@
             <a:spLocks noGrp="1"/>
           </p:cNvSpPr>
           <p:nvPr>
-            <p:ph type="dt" idx="12"/>
+            <p:ph type="dt" idx="1"/>
           </p:nvPr>
         </p:nvSpPr>
         <p:spPr/>
@@ -1598,7 +1473,7 @@
           <a:p>
             <a:fld id="{D18B56EA-E28F-4F92-9F16-7A6F2501B303}" type="datetime8">
               <a:rPr lang="en-US" smtClean="0"/>
-              <a:t>6/6/2018 7:26 PM</a:t>
+              <a:t>12/17/2018 10:46 AM</a:t>
             </a:fld>
             <a:endParaRPr lang="en-US" dirty="0"/>
           </a:p>
@@ -1611,7 +1486,7 @@
             <a:spLocks noGrp="1"/>
           </p:cNvSpPr>
           <p:nvPr>
-            <p:ph type="sldNum" sz="quarter" idx="13"/>
+            <p:ph type="sldNum" sz="quarter" idx="5"/>
           </p:nvPr>
         </p:nvSpPr>
         <p:spPr/>
@@ -1622,7 +1497,7 @@
             <a:fld id="{B4008EB6-D09E-4580-8CD6-DDB14511944F}" type="slidenum">
               <a:rPr lang="en-US" smtClean="0"/>
               <a:pPr/>
-              <a:t>6</a:t>
+              <a:t>5</a:t>
             </a:fld>
             <a:endParaRPr lang="en-US" dirty="0"/>
           </a:p>
@@ -1631,7 +1506,7 @@
     </p:spTree>
     <p:extLst>
       <p:ext uri="{BB962C8B-B14F-4D97-AF65-F5344CB8AC3E}">
-        <p14:creationId xmlns:p14="http://schemas.microsoft.com/office/powerpoint/2010/main" val="605721272"/>
+        <p14:creationId xmlns:p14="http://schemas.microsoft.com/office/powerpoint/2010/main" val="4072033623"/>
       </p:ext>
     </p:extLst>
   </p:cSld>
@@ -1779,7 +1654,7 @@
           <a:p>
             <a:fld id="{D18B56EA-E28F-4F92-9F16-7A6F2501B303}" type="datetime8">
               <a:rPr lang="en-US" smtClean="0"/>
-              <a:t>6/6/2018 7:49 PM</a:t>
+              <a:t>12/17/2018 10:37 AM</a:t>
             </a:fld>
             <a:endParaRPr lang="en-US" dirty="0"/>
           </a:p>
@@ -1803,7 +1678,7 @@
             <a:fld id="{B4008EB6-D09E-4580-8CD6-DDB14511944F}" type="slidenum">
               <a:rPr lang="en-US" smtClean="0"/>
               <a:pPr/>
-              <a:t>7</a:t>
+              <a:t>6</a:t>
             </a:fld>
             <a:endParaRPr lang="en-US" dirty="0"/>
           </a:p>
@@ -1963,7 +1838,7 @@
           <a:p>
             <a:fld id="{D18B56EA-E28F-4F92-9F16-7A6F2501B303}" type="datetime8">
               <a:rPr lang="en-US" smtClean="0"/>
-              <a:t>6/6/2018 7:56 PM</a:t>
+              <a:t>12/17/2018 10:37 AM</a:t>
             </a:fld>
             <a:endParaRPr lang="en-US" dirty="0"/>
           </a:p>
@@ -1987,7 +1862,7 @@
             <a:fld id="{B4008EB6-D09E-4580-8CD6-DDB14511944F}" type="slidenum">
               <a:rPr lang="en-US" smtClean="0"/>
               <a:pPr/>
-              <a:t>8</a:t>
+              <a:t>7</a:t>
             </a:fld>
             <a:endParaRPr lang="en-US" dirty="0"/>
           </a:p>
@@ -2144,7 +2019,7 @@
           <a:p>
             <a:fld id="{D18B56EA-E28F-4F92-9F16-7A6F2501B303}" type="datetime8">
               <a:rPr lang="en-US" smtClean="0"/>
-              <a:t>6/6/2018 6:48 PM</a:t>
+              <a:t>12/17/2018 10:37 AM</a:t>
             </a:fld>
             <a:endParaRPr lang="en-US" dirty="0"/>
           </a:p>
@@ -2168,7 +2043,7 @@
             <a:fld id="{B4008EB6-D09E-4580-8CD6-DDB14511944F}" type="slidenum">
               <a:rPr lang="en-US" smtClean="0"/>
               <a:pPr/>
-              <a:t>9</a:t>
+              <a:t>8</a:t>
             </a:fld>
             <a:endParaRPr lang="en-US" dirty="0"/>
           </a:p>
@@ -2325,7 +2200,7 @@
           <a:p>
             <a:fld id="{D18B56EA-E28F-4F92-9F16-7A6F2501B303}" type="datetime8">
               <a:rPr lang="en-US" smtClean="0"/>
-              <a:t>6/6/2018 6:48 PM</a:t>
+              <a:t>12/17/2018 10:37 AM</a:t>
             </a:fld>
             <a:endParaRPr lang="en-US" dirty="0"/>
           </a:p>
@@ -2349,7 +2224,7 @@
             <a:fld id="{B4008EB6-D09E-4580-8CD6-DDB14511944F}" type="slidenum">
               <a:rPr lang="en-US" smtClean="0"/>
               <a:pPr/>
-              <a:t>11</a:t>
+              <a:t>10</a:t>
             </a:fld>
             <a:endParaRPr lang="en-US" dirty="0"/>
           </a:p>
@@ -2506,7 +2381,7 @@
           <a:p>
             <a:fld id="{D18B56EA-E28F-4F92-9F16-7A6F2501B303}" type="datetime8">
               <a:rPr lang="en-US" smtClean="0"/>
-              <a:t>6/6/2018 6:48 PM</a:t>
+              <a:t>12/17/2018 10:37 AM</a:t>
             </a:fld>
             <a:endParaRPr lang="en-US" dirty="0"/>
           </a:p>
@@ -2530,7 +2405,7 @@
             <a:fld id="{B4008EB6-D09E-4580-8CD6-DDB14511944F}" type="slidenum">
               <a:rPr lang="en-US" smtClean="0"/>
               <a:pPr/>
-              <a:t>12</a:t>
+              <a:t>11</a:t>
             </a:fld>
             <a:endParaRPr lang="en-US" dirty="0"/>
           </a:p>
@@ -13036,358 +12911,6 @@
           <a:chExt cx="0" cy="0"/>
         </a:xfrm>
       </p:grpSpPr>
-      <p:pic>
-        <p:nvPicPr>
-          <p:cNvPr id="3" name="Picture 2">
-            <a:extLst>
-              <a:ext uri="{FF2B5EF4-FFF2-40B4-BE49-F238E27FC236}">
-                <a16:creationId xmlns:a16="http://schemas.microsoft.com/office/drawing/2014/main" id="{EE215EA7-7174-487D-949C-048DC5016E47}"/>
-              </a:ext>
-            </a:extLst>
-          </p:cNvPr>
-          <p:cNvPicPr>
-            <a:picLocks noChangeAspect="1"/>
-          </p:cNvPicPr>
-          <p:nvPr/>
-        </p:nvPicPr>
-        <p:blipFill rotWithShape="1">
-          <a:blip r:embed="rId2" cstate="screen">
-            <a:extLst>
-              <a:ext uri="{28A0092B-C50C-407E-A947-70E740481C1C}">
-                <a14:useLocalDpi xmlns:a14="http://schemas.microsoft.com/office/drawing/2010/main"/>
-              </a:ext>
-            </a:extLst>
-          </a:blip>
-          <a:srcRect l="27426" r="10166"/>
-          <a:stretch/>
-        </p:blipFill>
-        <p:spPr>
-          <a:xfrm>
-            <a:off x="5887091" y="0"/>
-            <a:ext cx="6549384" cy="6994525"/>
-          </a:xfrm>
-          <a:prstGeom prst="rect">
-            <a:avLst/>
-          </a:prstGeom>
-        </p:spPr>
-      </p:pic>
-      <p:sp>
-        <p:nvSpPr>
-          <p:cNvPr id="4" name="Title 3">
-            <a:extLst>
-              <a:ext uri="{FF2B5EF4-FFF2-40B4-BE49-F238E27FC236}">
-                <a16:creationId xmlns:a16="http://schemas.microsoft.com/office/drawing/2014/main" id="{8047349F-0B8F-4D12-A39C-718C1C57DDFF}"/>
-              </a:ext>
-            </a:extLst>
-          </p:cNvPr>
-          <p:cNvSpPr>
-            <a:spLocks noGrp="1"/>
-          </p:cNvSpPr>
-          <p:nvPr>
-            <p:ph type="title"/>
-          </p:nvPr>
-        </p:nvSpPr>
-        <p:spPr>
-          <a:xfrm>
-            <a:off x="454864" y="1843063"/>
-            <a:ext cx="11533187" cy="411162"/>
-          </a:xfrm>
-        </p:spPr>
-        <p:txBody>
-          <a:bodyPr/>
-          <a:lstStyle/>
-          <a:p>
-            <a:r>
-              <a:rPr lang="en-US" dirty="0"/>
-              <a:t>Summary</a:t>
-            </a:r>
-          </a:p>
-        </p:txBody>
-      </p:sp>
-      <p:sp>
-        <p:nvSpPr>
-          <p:cNvPr id="10" name="Text Placeholder 6">
-            <a:extLst>
-              <a:ext uri="{FF2B5EF4-FFF2-40B4-BE49-F238E27FC236}">
-                <a16:creationId xmlns:a16="http://schemas.microsoft.com/office/drawing/2014/main" id="{61D48218-75E0-4C6C-BFA7-A1010BADED35}"/>
-              </a:ext>
-            </a:extLst>
-          </p:cNvPr>
-          <p:cNvSpPr txBox="1">
-            <a:spLocks/>
-          </p:cNvSpPr>
-          <p:nvPr/>
-        </p:nvSpPr>
-        <p:spPr>
-          <a:xfrm>
-            <a:off x="465139" y="2621905"/>
-            <a:ext cx="4234184" cy="221599"/>
-          </a:xfrm>
-          <a:prstGeom prst="rect">
-            <a:avLst/>
-          </a:prstGeom>
-        </p:spPr>
-        <p:txBody>
-          <a:bodyPr vert="horz" wrap="square" lIns="0" tIns="0" rIns="0" bIns="0" rtlCol="0">
-            <a:spAutoFit/>
-          </a:bodyPr>
-          <a:lstStyle>
-            <a:lvl1pPr marL="0" marR="0" indent="0" algn="l" defTabSz="932742" rtl="0" eaLnBrk="1" fontAlgn="auto" latinLnBrk="0" hangingPunct="1">
-              <a:lnSpc>
-                <a:spcPts val="1800"/>
-              </a:lnSpc>
-              <a:spcBef>
-                <a:spcPts val="0"/>
-              </a:spcBef>
-              <a:spcAft>
-                <a:spcPts val="0"/>
-              </a:spcAft>
-              <a:buClrTx/>
-              <a:buSzPct val="90000"/>
-              <a:buFont typeface="Wingdings" panose="05000000000000000000" pitchFamily="2" charset="2"/>
-              <a:buNone/>
-              <a:tabLst/>
-              <a:defRPr sz="1400" b="1" kern="1200" spc="0" baseline="0">
-                <a:solidFill>
-                  <a:schemeClr val="tx1"/>
-                </a:solidFill>
-                <a:latin typeface="+mn-lt"/>
-                <a:ea typeface="+mn-ea"/>
-                <a:cs typeface="+mn-cs"/>
-              </a:defRPr>
-            </a:lvl1pPr>
-            <a:lvl2pPr marL="0" marR="0" indent="0" algn="l" defTabSz="932742" rtl="0" eaLnBrk="1" fontAlgn="auto" latinLnBrk="0" hangingPunct="1">
-              <a:lnSpc>
-                <a:spcPts val="1800"/>
-              </a:lnSpc>
-              <a:spcBef>
-                <a:spcPts val="0"/>
-              </a:spcBef>
-              <a:spcAft>
-                <a:spcPts val="0"/>
-              </a:spcAft>
-              <a:buClrTx/>
-              <a:buSzPct val="90000"/>
-              <a:buFont typeface="Wingdings" panose="05000000000000000000" pitchFamily="2" charset="2"/>
-              <a:buNone/>
-              <a:tabLst/>
-              <a:defRPr sz="1400" kern="1200" spc="0" baseline="0">
-                <a:solidFill>
-                  <a:schemeClr val="tx1"/>
-                </a:solidFill>
-                <a:latin typeface="+mn-lt"/>
-                <a:ea typeface="+mn-ea"/>
-                <a:cs typeface="+mn-cs"/>
-              </a:defRPr>
-            </a:lvl2pPr>
-            <a:lvl3pPr marL="457200" marR="0" indent="0" algn="l" defTabSz="932742" rtl="0" eaLnBrk="1" fontAlgn="auto" latinLnBrk="0" hangingPunct="1">
-              <a:lnSpc>
-                <a:spcPct val="90000"/>
-              </a:lnSpc>
-              <a:spcBef>
-                <a:spcPct val="20000"/>
-              </a:spcBef>
-              <a:spcAft>
-                <a:spcPts val="0"/>
-              </a:spcAft>
-              <a:buClrTx/>
-              <a:buSzPct val="90000"/>
-              <a:buFont typeface="Wingdings" panose="05000000000000000000" pitchFamily="2" charset="2"/>
-              <a:buNone/>
-              <a:tabLst/>
-              <a:defRPr sz="2400" kern="1200" spc="0" baseline="0">
-                <a:gradFill>
-                  <a:gsLst>
-                    <a:gs pos="1250">
-                      <a:schemeClr val="tx1"/>
-                    </a:gs>
-                    <a:gs pos="100000">
-                      <a:schemeClr val="tx1"/>
-                    </a:gs>
-                  </a:gsLst>
-                  <a:lin ang="5400000" scaled="0"/>
-                </a:gradFill>
-                <a:latin typeface="+mn-lt"/>
-                <a:ea typeface="+mn-ea"/>
-                <a:cs typeface="+mn-cs"/>
-              </a:defRPr>
-            </a:lvl3pPr>
-            <a:lvl4pPr marL="685800" marR="0" indent="0" algn="l" defTabSz="932742" rtl="0" eaLnBrk="1" fontAlgn="auto" latinLnBrk="0" hangingPunct="1">
-              <a:lnSpc>
-                <a:spcPct val="90000"/>
-              </a:lnSpc>
-              <a:spcBef>
-                <a:spcPct val="20000"/>
-              </a:spcBef>
-              <a:spcAft>
-                <a:spcPts val="0"/>
-              </a:spcAft>
-              <a:buClrTx/>
-              <a:buSzPct val="90000"/>
-              <a:buFont typeface="Wingdings" panose="05000000000000000000" pitchFamily="2" charset="2"/>
-              <a:buNone/>
-              <a:tabLst/>
-              <a:defRPr sz="2200" kern="1200" spc="0" baseline="0">
-                <a:gradFill>
-                  <a:gsLst>
-                    <a:gs pos="1250">
-                      <a:schemeClr val="tx1"/>
-                    </a:gs>
-                    <a:gs pos="100000">
-                      <a:schemeClr val="tx1"/>
-                    </a:gs>
-                  </a:gsLst>
-                  <a:lin ang="5400000" scaled="0"/>
-                </a:gradFill>
-                <a:latin typeface="+mn-lt"/>
-                <a:ea typeface="+mn-ea"/>
-                <a:cs typeface="+mn-cs"/>
-              </a:defRPr>
-            </a:lvl4pPr>
-            <a:lvl5pPr marL="914400" marR="0" indent="0" algn="l" defTabSz="932742" rtl="0" eaLnBrk="1" fontAlgn="auto" latinLnBrk="0" hangingPunct="1">
-              <a:lnSpc>
-                <a:spcPct val="90000"/>
-              </a:lnSpc>
-              <a:spcBef>
-                <a:spcPct val="20000"/>
-              </a:spcBef>
-              <a:spcAft>
-                <a:spcPts val="0"/>
-              </a:spcAft>
-              <a:buClrTx/>
-              <a:buSzPct val="90000"/>
-              <a:buFont typeface="Wingdings" panose="05000000000000000000" pitchFamily="2" charset="2"/>
-              <a:buNone/>
-              <a:tabLst/>
-              <a:defRPr sz="2200" kern="1200" spc="0" baseline="0">
-                <a:gradFill>
-                  <a:gsLst>
-                    <a:gs pos="1250">
-                      <a:schemeClr val="tx1"/>
-                    </a:gs>
-                    <a:gs pos="100000">
-                      <a:schemeClr val="tx1"/>
-                    </a:gs>
-                  </a:gsLst>
-                  <a:lin ang="5400000" scaled="0"/>
-                </a:gradFill>
-                <a:latin typeface="+mn-lt"/>
-                <a:ea typeface="+mn-ea"/>
-                <a:cs typeface="+mn-cs"/>
-              </a:defRPr>
-            </a:lvl5pPr>
-            <a:lvl6pPr marL="2565040" indent="-233186" algn="l" defTabSz="932742" rtl="0" eaLnBrk="1" latinLnBrk="0" hangingPunct="1">
-              <a:spcBef>
-                <a:spcPct val="20000"/>
-              </a:spcBef>
-              <a:buFont typeface="Arial" pitchFamily="34" charset="0"/>
-              <a:buChar char="•"/>
-              <a:defRPr sz="2000" kern="1200">
-                <a:solidFill>
-                  <a:schemeClr val="tx1"/>
-                </a:solidFill>
-                <a:latin typeface="+mn-lt"/>
-                <a:ea typeface="+mn-ea"/>
-                <a:cs typeface="+mn-cs"/>
-              </a:defRPr>
-            </a:lvl6pPr>
-            <a:lvl7pPr marL="3031412" indent="-233186" algn="l" defTabSz="932742" rtl="0" eaLnBrk="1" latinLnBrk="0" hangingPunct="1">
-              <a:spcBef>
-                <a:spcPct val="20000"/>
-              </a:spcBef>
-              <a:buFont typeface="Arial" pitchFamily="34" charset="0"/>
-              <a:buChar char="•"/>
-              <a:defRPr sz="2000" kern="1200">
-                <a:solidFill>
-                  <a:schemeClr val="tx1"/>
-                </a:solidFill>
-                <a:latin typeface="+mn-lt"/>
-                <a:ea typeface="+mn-ea"/>
-                <a:cs typeface="+mn-cs"/>
-              </a:defRPr>
-            </a:lvl7pPr>
-            <a:lvl8pPr marL="3497783" indent="-233186" algn="l" defTabSz="932742" rtl="0" eaLnBrk="1" latinLnBrk="0" hangingPunct="1">
-              <a:spcBef>
-                <a:spcPct val="20000"/>
-              </a:spcBef>
-              <a:buFont typeface="Arial" pitchFamily="34" charset="0"/>
-              <a:buChar char="•"/>
-              <a:defRPr sz="2000" kern="1200">
-                <a:solidFill>
-                  <a:schemeClr val="tx1"/>
-                </a:solidFill>
-                <a:latin typeface="+mn-lt"/>
-                <a:ea typeface="+mn-ea"/>
-                <a:cs typeface="+mn-cs"/>
-              </a:defRPr>
-            </a:lvl8pPr>
-            <a:lvl9pPr marL="3964155" indent="-233186" algn="l" defTabSz="932742" rtl="0" eaLnBrk="1" latinLnBrk="0" hangingPunct="1">
-              <a:spcBef>
-                <a:spcPct val="20000"/>
-              </a:spcBef>
-              <a:buFont typeface="Arial" pitchFamily="34" charset="0"/>
-              <a:buChar char="•"/>
-              <a:defRPr sz="2000" kern="1200">
-                <a:solidFill>
-                  <a:schemeClr val="tx1"/>
-                </a:solidFill>
-                <a:latin typeface="+mn-lt"/>
-                <a:ea typeface="+mn-ea"/>
-                <a:cs typeface="+mn-cs"/>
-              </a:defRPr>
-            </a:lvl9pPr>
-          </a:lstStyle>
-          <a:p>
-            <a:pPr lvl="0">
-              <a:lnSpc>
-                <a:spcPct val="90000"/>
-              </a:lnSpc>
-              <a:spcBef>
-                <a:spcPts val="1800"/>
-              </a:spcBef>
-            </a:pPr>
-            <a:endParaRPr lang="en-US" sz="1600" b="0" dirty="0">
-              <a:solidFill>
-                <a:srgbClr val="2F2F2F"/>
-              </a:solidFill>
-              <a:latin typeface="Segoe UI Semibold"/>
-            </a:endParaRPr>
-          </a:p>
-        </p:txBody>
-      </p:sp>
-    </p:spTree>
-    <p:extLst>
-      <p:ext uri="{BB962C8B-B14F-4D97-AF65-F5344CB8AC3E}">
-        <p14:creationId xmlns:p14="http://schemas.microsoft.com/office/powerpoint/2010/main" val="3651672785"/>
-      </p:ext>
-    </p:extLst>
-  </p:cSld>
-  <p:clrMapOvr>
-    <a:masterClrMapping/>
-  </p:clrMapOvr>
-  <p:transition>
-    <p:fade/>
-  </p:transition>
-</p:sld>
-</file>
-
-<file path=ppt/slides/slide11.xml><?xml version="1.0" encoding="utf-8"?>
-<p:sld xmlns:a="http://schemas.openxmlformats.org/drawingml/2006/main" xmlns:r="http://schemas.openxmlformats.org/officeDocument/2006/relationships" xmlns:p="http://schemas.openxmlformats.org/presentationml/2006/main">
-  <p:cSld>
-    <p:spTree>
-      <p:nvGrpSpPr>
-        <p:cNvPr id="1" name=""/>
-        <p:cNvGrpSpPr/>
-        <p:nvPr/>
-      </p:nvGrpSpPr>
-      <p:grpSpPr>
-        <a:xfrm>
-          <a:off x="0" y="0"/>
-          <a:ext cx="0" cy="0"/>
-          <a:chOff x="0" y="0"/>
-          <a:chExt cx="0" cy="0"/>
-        </a:xfrm>
-      </p:grpSpPr>
       <p:sp>
         <p:nvSpPr>
           <p:cNvPr id="2" name="Title 1"/>
@@ -13435,7 +12958,7 @@
 </p:sld>
 </file>
 
-<file path=ppt/slides/slide12.xml><?xml version="1.0" encoding="utf-8"?>
+<file path=ppt/slides/slide11.xml><?xml version="1.0" encoding="utf-8"?>
 <p:sld xmlns:a="http://schemas.openxmlformats.org/drawingml/2006/main" xmlns:r="http://schemas.openxmlformats.org/officeDocument/2006/relationships" xmlns:p="http://schemas.openxmlformats.org/presentationml/2006/main">
   <p:cSld>
     <p:spTree>
@@ -14798,7 +14321,7 @@
         <p:spPr>
           <a:xfrm>
             <a:off x="4283242" y="3223704"/>
-            <a:ext cx="3997159" cy="1483355"/>
+            <a:ext cx="3786021" cy="1137106"/>
           </a:xfrm>
         </p:spPr>
         <p:txBody>
@@ -14807,14 +14330,7 @@
           <a:p>
             <a:r>
               <a:rPr lang="en-US" sz="2000" dirty="0" err="1"/>
-              <a:t>Action.DisplayMessageForm</a:t>
-            </a:r>
-            <a:endParaRPr lang="en-US" sz="2000" dirty="0"/>
-          </a:p>
-          <a:p>
-            <a:r>
-              <a:rPr lang="en-US" sz="2000" dirty="0" err="1"/>
-              <a:t>Action.DisplayAppointmentForm</a:t>
+              <a:t>Action.Transaction</a:t>
             </a:r>
             <a:endParaRPr lang="en-US" sz="2000" dirty="0"/>
           </a:p>
@@ -14825,7 +14341,7 @@
                   <a:schemeClr val="tx1"/>
                 </a:solidFill>
               </a:rPr>
-              <a:t>Opens the read form of the specified message or calendar item.</a:t>
+              <a:t>Triggers the payments in Outlook experience using Microsoft Pay.</a:t>
             </a:r>
           </a:p>
           <a:p>
@@ -14956,971 +14472,6 @@
 </file>
 
 <file path=ppt/slides/slide6.xml><?xml version="1.0" encoding="utf-8"?>
-<p:sld xmlns:a="http://schemas.openxmlformats.org/drawingml/2006/main" xmlns:r="http://schemas.openxmlformats.org/officeDocument/2006/relationships" xmlns:p="http://schemas.openxmlformats.org/presentationml/2006/main">
-  <p:cSld>
-    <p:spTree>
-      <p:nvGrpSpPr>
-        <p:cNvPr id="1" name=""/>
-        <p:cNvGrpSpPr/>
-        <p:nvPr/>
-      </p:nvGrpSpPr>
-      <p:grpSpPr>
-        <a:xfrm>
-          <a:off x="0" y="0"/>
-          <a:ext cx="0" cy="0"/>
-          <a:chOff x="0" y="0"/>
-          <a:chExt cx="0" cy="0"/>
-        </a:xfrm>
-      </p:grpSpPr>
-      <p:graphicFrame>
-        <p:nvGraphicFramePr>
-          <p:cNvPr id="4" name="Table Placeholder 13">
-            <a:extLst>
-              <a:ext uri="{FF2B5EF4-FFF2-40B4-BE49-F238E27FC236}">
-                <a16:creationId xmlns:a16="http://schemas.microsoft.com/office/drawing/2014/main" id="{5EF7445C-C7DF-40C7-87C5-862B258EDDCF}"/>
-              </a:ext>
-            </a:extLst>
-          </p:cNvPr>
-          <p:cNvGraphicFramePr>
-            <a:graphicFrameLocks/>
-          </p:cNvGraphicFramePr>
-          <p:nvPr>
-            <p:extLst/>
-          </p:nvPr>
-        </p:nvGraphicFramePr>
-        <p:xfrm>
-          <a:off x="465138" y="1402081"/>
-          <a:ext cx="11533187" cy="5114466"/>
-        </p:xfrm>
-        <a:graphic>
-          <a:graphicData uri="http://schemas.openxmlformats.org/drawingml/2006/table">
-            <a:tbl>
-              <a:tblPr firstRow="1" bandRow="1">
-                <a:tableStyleId>{5C22544A-7EE6-4342-B048-85BDC9FD1C3A}</a:tableStyleId>
-              </a:tblPr>
-              <a:tblGrid>
-                <a:gridCol w="2079942">
-                  <a:extLst>
-                    <a:ext uri="{9D8B030D-6E8A-4147-A177-3AD203B41FA5}">
-                      <a16:colId xmlns:a16="http://schemas.microsoft.com/office/drawing/2014/main" val="2037588904"/>
-                    </a:ext>
-                  </a:extLst>
-                </a:gridCol>
-                <a:gridCol w="9453245">
-                  <a:extLst>
-                    <a:ext uri="{9D8B030D-6E8A-4147-A177-3AD203B41FA5}">
-                      <a16:colId xmlns:a16="http://schemas.microsoft.com/office/drawing/2014/main" val="200505750"/>
-                    </a:ext>
-                  </a:extLst>
-                </a:gridCol>
-              </a:tblGrid>
-              <a:tr h="732010">
-                <a:tc>
-                  <a:txBody>
-                    <a:bodyPr/>
-                    <a:lstStyle/>
-                    <a:p>
-                      <a:pPr>
-                        <a:lnSpc>
-                          <a:spcPts val="1600"/>
-                        </a:lnSpc>
-                      </a:pPr>
-                      <a:r>
-                        <a:rPr lang="en-US" sz="1800" b="0" dirty="0">
-                          <a:solidFill>
-                            <a:schemeClr val="bg2"/>
-                          </a:solidFill>
-                          <a:latin typeface="+mj-lt"/>
-                        </a:rPr>
-                        <a:t>Action</a:t>
-                      </a:r>
-                    </a:p>
-                  </a:txBody>
-                  <a:tcPr anchor="ctr">
-                    <a:lnL w="6350" cap="flat" cmpd="sng" algn="ctr">
-                      <a:noFill/>
-                      <a:prstDash val="solid"/>
-                      <a:round/>
-                      <a:headEnd type="none" w="med" len="med"/>
-                      <a:tailEnd type="none" w="med" len="med"/>
-                    </a:lnL>
-                    <a:lnR w="38100" cap="flat" cmpd="sng" algn="ctr">
-                      <a:solidFill>
-                        <a:schemeClr val="bg2"/>
-                      </a:solidFill>
-                      <a:prstDash val="solid"/>
-                      <a:round/>
-                      <a:headEnd type="none" w="med" len="med"/>
-                      <a:tailEnd type="none" w="med" len="med"/>
-                    </a:lnR>
-                    <a:lnT w="6350" cap="flat" cmpd="sng" algn="ctr">
-                      <a:noFill/>
-                      <a:prstDash val="solid"/>
-                      <a:round/>
-                      <a:headEnd type="none" w="med" len="med"/>
-                      <a:tailEnd type="none" w="med" len="med"/>
-                    </a:lnT>
-                    <a:lnB w="38100" cap="flat" cmpd="sng" algn="ctr">
-                      <a:solidFill>
-                        <a:schemeClr val="bg2"/>
-                      </a:solidFill>
-                      <a:prstDash val="solid"/>
-                      <a:round/>
-                      <a:headEnd type="none" w="med" len="med"/>
-                      <a:tailEnd type="none" w="med" len="med"/>
-                    </a:lnB>
-                    <a:lnTlToBr w="12700" cmpd="sng">
-                      <a:noFill/>
-                      <a:prstDash val="solid"/>
-                    </a:lnTlToBr>
-                    <a:lnBlToTr w="12700" cmpd="sng">
-                      <a:noFill/>
-                      <a:prstDash val="solid"/>
-                    </a:lnBlToTr>
-                    <a:solidFill>
-                      <a:schemeClr val="accent1"/>
-                    </a:solidFill>
-                  </a:tcPr>
-                </a:tc>
-                <a:tc>
-                  <a:txBody>
-                    <a:bodyPr/>
-                    <a:lstStyle/>
-                    <a:p>
-                      <a:pPr>
-                        <a:lnSpc>
-                          <a:spcPts val="1600"/>
-                        </a:lnSpc>
-                      </a:pPr>
-                      <a:r>
-                        <a:rPr lang="en-US" sz="1800" b="0" dirty="0">
-                          <a:solidFill>
-                            <a:schemeClr val="bg2"/>
-                          </a:solidFill>
-                          <a:latin typeface="+mj-lt"/>
-                        </a:rPr>
-                        <a:t>Description</a:t>
-                      </a:r>
-                    </a:p>
-                  </a:txBody>
-                  <a:tcPr anchor="ctr">
-                    <a:lnL w="38100" cap="flat" cmpd="sng" algn="ctr">
-                      <a:solidFill>
-                        <a:schemeClr val="bg2"/>
-                      </a:solidFill>
-                      <a:prstDash val="solid"/>
-                      <a:round/>
-                      <a:headEnd type="none" w="med" len="med"/>
-                      <a:tailEnd type="none" w="med" len="med"/>
-                    </a:lnL>
-                    <a:lnR w="38100" cap="flat" cmpd="sng" algn="ctr">
-                      <a:solidFill>
-                        <a:schemeClr val="bg2"/>
-                      </a:solidFill>
-                      <a:prstDash val="solid"/>
-                      <a:round/>
-                      <a:headEnd type="none" w="med" len="med"/>
-                      <a:tailEnd type="none" w="med" len="med"/>
-                    </a:lnR>
-                    <a:lnT w="6350" cap="flat" cmpd="sng" algn="ctr">
-                      <a:noFill/>
-                      <a:prstDash val="solid"/>
-                      <a:round/>
-                      <a:headEnd type="none" w="med" len="med"/>
-                      <a:tailEnd type="none" w="med" len="med"/>
-                    </a:lnT>
-                    <a:lnB w="38100" cap="flat" cmpd="sng" algn="ctr">
-                      <a:solidFill>
-                        <a:schemeClr val="bg2"/>
-                      </a:solidFill>
-                      <a:prstDash val="solid"/>
-                      <a:round/>
-                      <a:headEnd type="none" w="med" len="med"/>
-                      <a:tailEnd type="none" w="med" len="med"/>
-                    </a:lnB>
-                    <a:lnTlToBr w="12700" cmpd="sng">
-                      <a:noFill/>
-                      <a:prstDash val="solid"/>
-                    </a:lnTlToBr>
-                    <a:lnBlToTr w="12700" cmpd="sng">
-                      <a:noFill/>
-                      <a:prstDash val="solid"/>
-                    </a:lnBlToTr>
-                    <a:solidFill>
-                      <a:schemeClr val="accent1"/>
-                    </a:solidFill>
-                  </a:tcPr>
-                </a:tc>
-                <a:extLst>
-                  <a:ext uri="{0D108BD9-81ED-4DB2-BD59-A6C34878D82A}">
-                    <a16:rowId xmlns:a16="http://schemas.microsoft.com/office/drawing/2014/main" val="834266737"/>
-                  </a:ext>
-                </a:extLst>
-              </a:tr>
-              <a:tr h="2197827">
-                <a:tc>
-                  <a:txBody>
-                    <a:bodyPr/>
-                    <a:lstStyle/>
-                    <a:p>
-                      <a:pPr>
-                        <a:lnSpc>
-                          <a:spcPts val="1600"/>
-                        </a:lnSpc>
-                      </a:pPr>
-                      <a:r>
-                        <a:rPr lang="en-US" sz="1600" b="0" i="0" dirty="0" err="1">
-                          <a:solidFill>
-                            <a:schemeClr val="accent1"/>
-                          </a:solidFill>
-                          <a:latin typeface="+mj-lt"/>
-                        </a:rPr>
-                        <a:t>OpenUri</a:t>
-                      </a:r>
-                      <a:endParaRPr lang="en-US" sz="1600" b="0" i="0" dirty="0">
-                        <a:solidFill>
-                          <a:schemeClr val="accent1"/>
-                        </a:solidFill>
-                        <a:latin typeface="+mj-lt"/>
-                      </a:endParaRPr>
-                    </a:p>
-                  </a:txBody>
-                  <a:tcPr anchor="ctr">
-                    <a:lnL w="6350" cap="flat" cmpd="sng" algn="ctr">
-                      <a:noFill/>
-                      <a:prstDash val="solid"/>
-                      <a:round/>
-                      <a:headEnd type="none" w="med" len="med"/>
-                      <a:tailEnd type="none" w="med" len="med"/>
-                    </a:lnL>
-                    <a:lnR w="38100" cap="flat" cmpd="sng" algn="ctr">
-                      <a:solidFill>
-                        <a:schemeClr val="bg2"/>
-                      </a:solidFill>
-                      <a:prstDash val="solid"/>
-                      <a:round/>
-                      <a:headEnd type="none" w="med" len="med"/>
-                      <a:tailEnd type="none" w="med" len="med"/>
-                    </a:lnR>
-                    <a:lnT w="38100" cap="flat" cmpd="sng" algn="ctr">
-                      <a:solidFill>
-                        <a:schemeClr val="bg2"/>
-                      </a:solidFill>
-                      <a:prstDash val="solid"/>
-                      <a:round/>
-                      <a:headEnd type="none" w="med" len="med"/>
-                      <a:tailEnd type="none" w="med" len="med"/>
-                    </a:lnT>
-                    <a:lnB w="38100" cap="flat" cmpd="sng" algn="ctr">
-                      <a:solidFill>
-                        <a:schemeClr val="bg2"/>
-                      </a:solidFill>
-                      <a:prstDash val="solid"/>
-                      <a:round/>
-                      <a:headEnd type="none" w="med" len="med"/>
-                      <a:tailEnd type="none" w="med" len="med"/>
-                    </a:lnB>
-                    <a:lnTlToBr w="12700" cmpd="sng">
-                      <a:noFill/>
-                      <a:prstDash val="solid"/>
-                    </a:lnTlToBr>
-                    <a:lnBlToTr w="12700" cmpd="sng">
-                      <a:noFill/>
-                      <a:prstDash val="solid"/>
-                    </a:lnBlToTr>
-                    <a:solidFill>
-                      <a:schemeClr val="bg1"/>
-                    </a:solidFill>
-                  </a:tcPr>
-                </a:tc>
-                <a:tc>
-                  <a:txBody>
-                    <a:bodyPr/>
-                    <a:lstStyle/>
-                    <a:p>
-                      <a:pPr>
-                        <a:lnSpc>
-                          <a:spcPts val="1600"/>
-                        </a:lnSpc>
-                      </a:pPr>
-                      <a:r>
-                        <a:rPr lang="en-US" sz="1600" b="0" i="0" dirty="0">
-                          <a:latin typeface="+mj-lt"/>
-                        </a:rPr>
-                        <a:t>Opens a URI in a browser or app</a:t>
-                      </a:r>
-                    </a:p>
-                    <a:p>
-                      <a:pPr>
-                        <a:lnSpc>
-                          <a:spcPts val="1600"/>
-                        </a:lnSpc>
-                      </a:pPr>
-                      <a:r>
-                        <a:rPr lang="en-US" sz="1400" b="1" i="0" dirty="0">
-                          <a:latin typeface="+mn-lt"/>
-                        </a:rPr>
-                        <a:t> </a:t>
-                      </a:r>
-                    </a:p>
-                    <a:p>
-                      <a:pPr>
-                        <a:lnSpc>
-                          <a:spcPts val="1600"/>
-                        </a:lnSpc>
-                      </a:pPr>
-                      <a:r>
-                        <a:rPr lang="en-US" sz="1400" b="0" i="0" dirty="0">
-                          <a:latin typeface="Consolas" panose="020B0609020204030204" pitchFamily="49" charset="0"/>
-                        </a:rPr>
-                        <a:t>"targets": [</a:t>
-                      </a:r>
-                    </a:p>
-                    <a:p>
-                      <a:pPr>
-                        <a:lnSpc>
-                          <a:spcPts val="1600"/>
-                        </a:lnSpc>
-                      </a:pPr>
-                      <a:r>
-                        <a:rPr lang="en-US" sz="1400" b="0" i="0" dirty="0">
-                          <a:latin typeface="Consolas" panose="020B0609020204030204" pitchFamily="49" charset="0"/>
-                        </a:rPr>
-                        <a:t>    { "</a:t>
-                      </a:r>
-                      <a:r>
-                        <a:rPr lang="en-US" sz="1400" b="0" i="0" dirty="0" err="1">
-                          <a:latin typeface="Consolas" panose="020B0609020204030204" pitchFamily="49" charset="0"/>
-                        </a:rPr>
-                        <a:t>os</a:t>
-                      </a:r>
-                      <a:r>
-                        <a:rPr lang="en-US" sz="1400" b="0" i="0" dirty="0">
-                          <a:latin typeface="Consolas" panose="020B0609020204030204" pitchFamily="49" charset="0"/>
-                        </a:rPr>
-                        <a:t>": "default", "</a:t>
-                      </a:r>
-                      <a:r>
-                        <a:rPr lang="en-US" sz="1400" b="0" i="0" dirty="0" err="1">
-                          <a:latin typeface="Consolas" panose="020B0609020204030204" pitchFamily="49" charset="0"/>
-                        </a:rPr>
-                        <a:t>uri</a:t>
-                      </a:r>
-                      <a:r>
-                        <a:rPr lang="en-US" sz="1400" b="0" i="0" dirty="0">
-                          <a:latin typeface="Consolas" panose="020B0609020204030204" pitchFamily="49" charset="0"/>
-                        </a:rPr>
-                        <a:t>": "https://yammer.com/.../123" },</a:t>
-                      </a:r>
-                    </a:p>
-                    <a:p>
-                      <a:pPr>
-                        <a:lnSpc>
-                          <a:spcPts val="1600"/>
-                        </a:lnSpc>
-                      </a:pPr>
-                      <a:r>
-                        <a:rPr lang="en-US" sz="1400" b="0" i="0" dirty="0">
-                          <a:latin typeface="Consolas" panose="020B0609020204030204" pitchFamily="49" charset="0"/>
-                        </a:rPr>
-                        <a:t>    { "</a:t>
-                      </a:r>
-                      <a:r>
-                        <a:rPr lang="en-US" sz="1400" b="0" i="0" dirty="0" err="1">
-                          <a:latin typeface="Consolas" panose="020B0609020204030204" pitchFamily="49" charset="0"/>
-                        </a:rPr>
-                        <a:t>os</a:t>
-                      </a:r>
-                      <a:r>
-                        <a:rPr lang="en-US" sz="1400" b="0" i="0" dirty="0">
-                          <a:latin typeface="Consolas" panose="020B0609020204030204" pitchFamily="49" charset="0"/>
-                        </a:rPr>
-                        <a:t>": "iOS", "</a:t>
-                      </a:r>
-                      <a:r>
-                        <a:rPr lang="en-US" sz="1400" b="0" i="0" dirty="0" err="1">
-                          <a:latin typeface="Consolas" panose="020B0609020204030204" pitchFamily="49" charset="0"/>
-                        </a:rPr>
-                        <a:t>uri</a:t>
-                      </a:r>
-                      <a:r>
-                        <a:rPr lang="en-US" sz="1400" b="0" i="0" dirty="0">
-                          <a:latin typeface="Consolas" panose="020B0609020204030204" pitchFamily="49" charset="0"/>
-                        </a:rPr>
-                        <a:t>": "yammer://u/123" },</a:t>
-                      </a:r>
-                    </a:p>
-                    <a:p>
-                      <a:pPr>
-                        <a:lnSpc>
-                          <a:spcPts val="1600"/>
-                        </a:lnSpc>
-                      </a:pPr>
-                      <a:r>
-                        <a:rPr lang="en-US" sz="1400" b="0" i="0" dirty="0">
-                          <a:latin typeface="Consolas" panose="020B0609020204030204" pitchFamily="49" charset="0"/>
-                        </a:rPr>
-                        <a:t>    { "</a:t>
-                      </a:r>
-                      <a:r>
-                        <a:rPr lang="en-US" sz="1400" b="0" i="0" dirty="0" err="1">
-                          <a:latin typeface="Consolas" panose="020B0609020204030204" pitchFamily="49" charset="0"/>
-                        </a:rPr>
-                        <a:t>os</a:t>
-                      </a:r>
-                      <a:r>
-                        <a:rPr lang="en-US" sz="1400" b="0" i="0" dirty="0">
-                          <a:latin typeface="Consolas" panose="020B0609020204030204" pitchFamily="49" charset="0"/>
-                        </a:rPr>
-                        <a:t>": "android", "</a:t>
-                      </a:r>
-                      <a:r>
-                        <a:rPr lang="en-US" sz="1400" b="0" i="0" dirty="0" err="1">
-                          <a:latin typeface="Consolas" panose="020B0609020204030204" pitchFamily="49" charset="0"/>
-                        </a:rPr>
-                        <a:t>uri</a:t>
-                      </a:r>
-                      <a:r>
-                        <a:rPr lang="en-US" sz="1400" b="0" i="0" dirty="0">
-                          <a:latin typeface="Consolas" panose="020B0609020204030204" pitchFamily="49" charset="0"/>
-                        </a:rPr>
-                        <a:t>": "yammer://u/123" },</a:t>
-                      </a:r>
-                    </a:p>
-                    <a:p>
-                      <a:pPr>
-                        <a:lnSpc>
-                          <a:spcPts val="1600"/>
-                        </a:lnSpc>
-                      </a:pPr>
-                      <a:r>
-                        <a:rPr lang="en-US" sz="1400" b="0" i="0" dirty="0">
-                          <a:latin typeface="Consolas" panose="020B0609020204030204" pitchFamily="49" charset="0"/>
-                        </a:rPr>
-                        <a:t>    { "</a:t>
-                      </a:r>
-                      <a:r>
-                        <a:rPr lang="en-US" sz="1400" b="0" i="0" dirty="0" err="1">
-                          <a:latin typeface="Consolas" panose="020B0609020204030204" pitchFamily="49" charset="0"/>
-                        </a:rPr>
-                        <a:t>os</a:t>
-                      </a:r>
-                      <a:r>
-                        <a:rPr lang="en-US" sz="1400" b="0" i="0" dirty="0">
-                          <a:latin typeface="Consolas" panose="020B0609020204030204" pitchFamily="49" charset="0"/>
-                        </a:rPr>
-                        <a:t>": "windows", "</a:t>
-                      </a:r>
-                      <a:r>
-                        <a:rPr lang="en-US" sz="1400" b="0" i="0" dirty="0" err="1">
-                          <a:latin typeface="Consolas" panose="020B0609020204030204" pitchFamily="49" charset="0"/>
-                        </a:rPr>
-                        <a:t>uri</a:t>
-                      </a:r>
-                      <a:r>
-                        <a:rPr lang="en-US" sz="1400" b="0" i="0" dirty="0">
-                          <a:latin typeface="Consolas" panose="020B0609020204030204" pitchFamily="49" charset="0"/>
-                        </a:rPr>
-                        <a:t>": "yammer://u/123" }</a:t>
-                      </a:r>
-                    </a:p>
-                    <a:p>
-                      <a:pPr>
-                        <a:lnSpc>
-                          <a:spcPts val="1600"/>
-                        </a:lnSpc>
-                      </a:pPr>
-                      <a:r>
-                        <a:rPr lang="en-US" sz="1400" b="0" i="0" dirty="0">
-                          <a:latin typeface="Consolas" panose="020B0609020204030204" pitchFamily="49" charset="0"/>
-                        </a:rPr>
-                        <a:t>]</a:t>
-                      </a:r>
-                    </a:p>
-                  </a:txBody>
-                  <a:tcPr anchor="ctr">
-                    <a:lnL w="38100" cap="flat" cmpd="sng" algn="ctr">
-                      <a:solidFill>
-                        <a:schemeClr val="bg2"/>
-                      </a:solidFill>
-                      <a:prstDash val="solid"/>
-                      <a:round/>
-                      <a:headEnd type="none" w="med" len="med"/>
-                      <a:tailEnd type="none" w="med" len="med"/>
-                    </a:lnL>
-                    <a:lnR w="38100" cap="flat" cmpd="sng" algn="ctr">
-                      <a:solidFill>
-                        <a:schemeClr val="bg2"/>
-                      </a:solidFill>
-                      <a:prstDash val="solid"/>
-                      <a:round/>
-                      <a:headEnd type="none" w="med" len="med"/>
-                      <a:tailEnd type="none" w="med" len="med"/>
-                    </a:lnR>
-                    <a:lnT w="38100" cap="flat" cmpd="sng" algn="ctr">
-                      <a:solidFill>
-                        <a:schemeClr val="bg2"/>
-                      </a:solidFill>
-                      <a:prstDash val="solid"/>
-                      <a:round/>
-                      <a:headEnd type="none" w="med" len="med"/>
-                      <a:tailEnd type="none" w="med" len="med"/>
-                    </a:lnT>
-                    <a:lnB w="38100" cap="flat" cmpd="sng" algn="ctr">
-                      <a:solidFill>
-                        <a:schemeClr val="bg2"/>
-                      </a:solidFill>
-                      <a:prstDash val="solid"/>
-                      <a:round/>
-                      <a:headEnd type="none" w="med" len="med"/>
-                      <a:tailEnd type="none" w="med" len="med"/>
-                    </a:lnB>
-                    <a:lnTlToBr w="12700" cmpd="sng">
-                      <a:noFill/>
-                      <a:prstDash val="solid"/>
-                    </a:lnTlToBr>
-                    <a:lnBlToTr w="12700" cmpd="sng">
-                      <a:noFill/>
-                      <a:prstDash val="solid"/>
-                    </a:lnBlToTr>
-                    <a:solidFill>
-                      <a:schemeClr val="bg1"/>
-                    </a:solidFill>
-                  </a:tcPr>
-                </a:tc>
-                <a:extLst>
-                  <a:ext uri="{0D108BD9-81ED-4DB2-BD59-A6C34878D82A}">
-                    <a16:rowId xmlns:a16="http://schemas.microsoft.com/office/drawing/2014/main" val="3223557"/>
-                  </a:ext>
-                </a:extLst>
-              </a:tr>
-              <a:tr h="1112095">
-                <a:tc>
-                  <a:txBody>
-                    <a:bodyPr/>
-                    <a:lstStyle/>
-                    <a:p>
-                      <a:pPr>
-                        <a:lnSpc>
-                          <a:spcPts val="1600"/>
-                        </a:lnSpc>
-                      </a:pPr>
-                      <a:r>
-                        <a:rPr lang="en-US" sz="1600" b="0" i="0" dirty="0" err="1">
-                          <a:solidFill>
-                            <a:schemeClr val="accent1"/>
-                          </a:solidFill>
-                          <a:latin typeface="+mj-lt"/>
-                        </a:rPr>
-                        <a:t>HttpPOST</a:t>
-                      </a:r>
-                      <a:endParaRPr lang="en-US" sz="1600" b="0" i="0" dirty="0">
-                        <a:solidFill>
-                          <a:schemeClr val="accent1"/>
-                        </a:solidFill>
-                        <a:latin typeface="+mj-lt"/>
-                      </a:endParaRPr>
-                    </a:p>
-                  </a:txBody>
-                  <a:tcPr anchor="ctr">
-                    <a:lnL w="6350" cap="flat" cmpd="sng" algn="ctr">
-                      <a:noFill/>
-                      <a:prstDash val="solid"/>
-                      <a:round/>
-                      <a:headEnd type="none" w="med" len="med"/>
-                      <a:tailEnd type="none" w="med" len="med"/>
-                    </a:lnL>
-                    <a:lnR w="38100" cap="flat" cmpd="sng" algn="ctr">
-                      <a:solidFill>
-                        <a:schemeClr val="bg2"/>
-                      </a:solidFill>
-                      <a:prstDash val="solid"/>
-                      <a:round/>
-                      <a:headEnd type="none" w="med" len="med"/>
-                      <a:tailEnd type="none" w="med" len="med"/>
-                    </a:lnR>
-                    <a:lnT w="38100" cap="flat" cmpd="sng" algn="ctr">
-                      <a:solidFill>
-                        <a:schemeClr val="bg2"/>
-                      </a:solidFill>
-                      <a:prstDash val="solid"/>
-                      <a:round/>
-                      <a:headEnd type="none" w="med" len="med"/>
-                      <a:tailEnd type="none" w="med" len="med"/>
-                    </a:lnT>
-                    <a:lnB w="38100" cap="flat" cmpd="sng" algn="ctr">
-                      <a:solidFill>
-                        <a:schemeClr val="bg2"/>
-                      </a:solidFill>
-                      <a:prstDash val="solid"/>
-                      <a:round/>
-                      <a:headEnd type="none" w="med" len="med"/>
-                      <a:tailEnd type="none" w="med" len="med"/>
-                    </a:lnB>
-                    <a:lnTlToBr w="12700" cmpd="sng">
-                      <a:noFill/>
-                      <a:prstDash val="solid"/>
-                    </a:lnTlToBr>
-                    <a:lnBlToTr w="12700" cmpd="sng">
-                      <a:noFill/>
-                      <a:prstDash val="solid"/>
-                    </a:lnBlToTr>
-                    <a:solidFill>
-                      <a:schemeClr val="bg1"/>
-                    </a:solidFill>
-                  </a:tcPr>
-                </a:tc>
-                <a:tc>
-                  <a:txBody>
-                    <a:bodyPr/>
-                    <a:lstStyle/>
-                    <a:p>
-                      <a:pPr marL="0" marR="0" lvl="0" indent="0" algn="l" defTabSz="932742" rtl="0" eaLnBrk="1" fontAlgn="auto" latinLnBrk="0" hangingPunct="1">
-                        <a:lnSpc>
-                          <a:spcPts val="1600"/>
-                        </a:lnSpc>
-                        <a:spcBef>
-                          <a:spcPts val="0"/>
-                        </a:spcBef>
-                        <a:spcAft>
-                          <a:spcPts val="0"/>
-                        </a:spcAft>
-                        <a:buClrTx/>
-                        <a:buSzTx/>
-                        <a:buFontTx/>
-                        <a:buNone/>
-                        <a:tabLst/>
-                        <a:defRPr/>
-                      </a:pPr>
-                      <a:r>
-                        <a:rPr lang="en-US" sz="1600" b="0" i="0" kern="1200" noProof="0" dirty="0">
-                          <a:solidFill>
-                            <a:schemeClr val="dk1"/>
-                          </a:solidFill>
-                          <a:latin typeface="+mj-lt"/>
-                          <a:ea typeface="+mn-ea"/>
-                          <a:cs typeface="+mn-cs"/>
-                        </a:rPr>
-                        <a:t>HTTP POST request is sent to the specified URL, containing an HTTP authorization bearer token header and optional limited purpose token</a:t>
-                      </a:r>
-                    </a:p>
-                  </a:txBody>
-                  <a:tcPr anchor="ctr">
-                    <a:lnL w="38100" cap="flat" cmpd="sng" algn="ctr">
-                      <a:solidFill>
-                        <a:schemeClr val="bg2"/>
-                      </a:solidFill>
-                      <a:prstDash val="solid"/>
-                      <a:round/>
-                      <a:headEnd type="none" w="med" len="med"/>
-                      <a:tailEnd type="none" w="med" len="med"/>
-                    </a:lnL>
-                    <a:lnR w="38100" cap="flat" cmpd="sng" algn="ctr">
-                      <a:solidFill>
-                        <a:schemeClr val="bg2"/>
-                      </a:solidFill>
-                      <a:prstDash val="solid"/>
-                      <a:round/>
-                      <a:headEnd type="none" w="med" len="med"/>
-                      <a:tailEnd type="none" w="med" len="med"/>
-                    </a:lnR>
-                    <a:lnT w="38100" cap="flat" cmpd="sng" algn="ctr">
-                      <a:solidFill>
-                        <a:schemeClr val="bg2"/>
-                      </a:solidFill>
-                      <a:prstDash val="solid"/>
-                      <a:round/>
-                      <a:headEnd type="none" w="med" len="med"/>
-                      <a:tailEnd type="none" w="med" len="med"/>
-                    </a:lnT>
-                    <a:lnB w="38100" cap="flat" cmpd="sng" algn="ctr">
-                      <a:solidFill>
-                        <a:schemeClr val="bg2"/>
-                      </a:solidFill>
-                      <a:prstDash val="solid"/>
-                      <a:round/>
-                      <a:headEnd type="none" w="med" len="med"/>
-                      <a:tailEnd type="none" w="med" len="med"/>
-                    </a:lnB>
-                    <a:lnTlToBr w="12700" cmpd="sng">
-                      <a:noFill/>
-                      <a:prstDash val="solid"/>
-                    </a:lnTlToBr>
-                    <a:lnBlToTr w="12700" cmpd="sng">
-                      <a:noFill/>
-                      <a:prstDash val="solid"/>
-                    </a:lnBlToTr>
-                    <a:solidFill>
-                      <a:schemeClr val="bg1"/>
-                    </a:solidFill>
-                  </a:tcPr>
-                </a:tc>
-                <a:extLst>
-                  <a:ext uri="{0D108BD9-81ED-4DB2-BD59-A6C34878D82A}">
-                    <a16:rowId xmlns:a16="http://schemas.microsoft.com/office/drawing/2014/main" val="591507760"/>
-                  </a:ext>
-                </a:extLst>
-              </a:tr>
-              <a:tr h="1072534">
-                <a:tc>
-                  <a:txBody>
-                    <a:bodyPr/>
-                    <a:lstStyle/>
-                    <a:p>
-                      <a:pPr>
-                        <a:lnSpc>
-                          <a:spcPts val="1600"/>
-                        </a:lnSpc>
-                      </a:pPr>
-                      <a:r>
-                        <a:rPr lang="en-US" sz="1600" b="0" i="0" dirty="0" err="1">
-                          <a:solidFill>
-                            <a:schemeClr val="accent1"/>
-                          </a:solidFill>
-                          <a:latin typeface="+mj-lt"/>
-                        </a:rPr>
-                        <a:t>ActionCard</a:t>
-                      </a:r>
-                      <a:endParaRPr lang="en-US" sz="1600" b="0" i="0" dirty="0">
-                        <a:solidFill>
-                          <a:schemeClr val="accent1"/>
-                        </a:solidFill>
-                        <a:latin typeface="+mj-lt"/>
-                      </a:endParaRPr>
-                    </a:p>
-                  </a:txBody>
-                  <a:tcPr anchor="ctr">
-                    <a:lnL w="6350" cap="flat" cmpd="sng" algn="ctr">
-                      <a:noFill/>
-                      <a:prstDash val="solid"/>
-                      <a:round/>
-                      <a:headEnd type="none" w="med" len="med"/>
-                      <a:tailEnd type="none" w="med" len="med"/>
-                    </a:lnL>
-                    <a:lnR w="38100" cap="flat" cmpd="sng" algn="ctr">
-                      <a:solidFill>
-                        <a:schemeClr val="bg2"/>
-                      </a:solidFill>
-                      <a:prstDash val="solid"/>
-                      <a:round/>
-                      <a:headEnd type="none" w="med" len="med"/>
-                      <a:tailEnd type="none" w="med" len="med"/>
-                    </a:lnR>
-                    <a:lnT w="38100" cap="flat" cmpd="sng" algn="ctr">
-                      <a:solidFill>
-                        <a:schemeClr val="bg2"/>
-                      </a:solidFill>
-                      <a:prstDash val="solid"/>
-                      <a:round/>
-                      <a:headEnd type="none" w="med" len="med"/>
-                      <a:tailEnd type="none" w="med" len="med"/>
-                    </a:lnT>
-                    <a:lnB w="38100" cap="flat" cmpd="sng" algn="ctr">
-                      <a:solidFill>
-                        <a:schemeClr val="bg2"/>
-                      </a:solidFill>
-                      <a:prstDash val="solid"/>
-                      <a:round/>
-                      <a:headEnd type="none" w="med" len="med"/>
-                      <a:tailEnd type="none" w="med" len="med"/>
-                    </a:lnB>
-                    <a:lnTlToBr w="12700" cmpd="sng">
-                      <a:noFill/>
-                      <a:prstDash val="solid"/>
-                    </a:lnTlToBr>
-                    <a:lnBlToTr w="12700" cmpd="sng">
-                      <a:noFill/>
-                      <a:prstDash val="solid"/>
-                    </a:lnBlToTr>
-                    <a:solidFill>
-                      <a:schemeClr val="bg1"/>
-                    </a:solidFill>
-                  </a:tcPr>
-                </a:tc>
-                <a:tc>
-                  <a:txBody>
-                    <a:bodyPr/>
-                    <a:lstStyle/>
-                    <a:p>
-                      <a:pPr marL="0" marR="0" lvl="0" indent="0" algn="l" defTabSz="932742" rtl="0" eaLnBrk="1" fontAlgn="auto" latinLnBrk="0" hangingPunct="1">
-                        <a:lnSpc>
-                          <a:spcPts val="1600"/>
-                        </a:lnSpc>
-                        <a:spcBef>
-                          <a:spcPts val="0"/>
-                        </a:spcBef>
-                        <a:spcAft>
-                          <a:spcPts val="0"/>
-                        </a:spcAft>
-                        <a:buClrTx/>
-                        <a:buSzTx/>
-                        <a:buFontTx/>
-                        <a:buNone/>
-                        <a:tabLst/>
-                        <a:defRPr/>
-                      </a:pPr>
-                      <a:r>
-                        <a:rPr lang="en-US" sz="1600" b="0" i="0" kern="1200" noProof="0" dirty="0">
-                          <a:solidFill>
-                            <a:schemeClr val="dk1"/>
-                          </a:solidFill>
-                          <a:latin typeface="+mj-lt"/>
-                          <a:ea typeface="+mn-ea"/>
-                          <a:cs typeface="+mn-cs"/>
-                        </a:rPr>
-                        <a:t>Presents additional UI that contains one or more Inputs, along with associated actions that can be either </a:t>
-                      </a:r>
-                      <a:r>
-                        <a:rPr lang="en-US" sz="1600" b="0" i="0" kern="1200" noProof="0" dirty="0" err="1">
-                          <a:solidFill>
-                            <a:schemeClr val="dk1"/>
-                          </a:solidFill>
-                          <a:latin typeface="+mj-lt"/>
-                          <a:ea typeface="+mn-ea"/>
-                          <a:cs typeface="+mn-cs"/>
-                        </a:rPr>
-                        <a:t>OpenUri</a:t>
-                      </a:r>
-                      <a:r>
-                        <a:rPr lang="en-US" sz="1600" b="0" i="0" kern="1200" noProof="0" dirty="0">
-                          <a:solidFill>
-                            <a:schemeClr val="dk1"/>
-                          </a:solidFill>
-                          <a:latin typeface="+mj-lt"/>
-                          <a:ea typeface="+mn-ea"/>
-                          <a:cs typeface="+mn-cs"/>
-                        </a:rPr>
-                        <a:t> or </a:t>
-                      </a:r>
-                      <a:r>
-                        <a:rPr lang="en-US" sz="1600" b="0" i="0" kern="1200" noProof="0" dirty="0" err="1">
-                          <a:solidFill>
-                            <a:schemeClr val="dk1"/>
-                          </a:solidFill>
-                          <a:latin typeface="+mj-lt"/>
-                          <a:ea typeface="+mn-ea"/>
-                          <a:cs typeface="+mn-cs"/>
-                        </a:rPr>
-                        <a:t>HttpPOST</a:t>
-                      </a:r>
-                      <a:r>
-                        <a:rPr lang="en-US" sz="1600" b="0" i="0" kern="1200" noProof="0" dirty="0">
-                          <a:solidFill>
-                            <a:schemeClr val="dk1"/>
-                          </a:solidFill>
-                          <a:latin typeface="+mj-lt"/>
-                          <a:ea typeface="+mn-ea"/>
-                          <a:cs typeface="+mn-cs"/>
-                        </a:rPr>
-                        <a:t> types.</a:t>
-                      </a:r>
-                    </a:p>
-                  </a:txBody>
-                  <a:tcPr anchor="ctr">
-                    <a:lnL w="38100" cap="flat" cmpd="sng" algn="ctr">
-                      <a:solidFill>
-                        <a:schemeClr val="bg2"/>
-                      </a:solidFill>
-                      <a:prstDash val="solid"/>
-                      <a:round/>
-                      <a:headEnd type="none" w="med" len="med"/>
-                      <a:tailEnd type="none" w="med" len="med"/>
-                    </a:lnL>
-                    <a:lnR w="38100" cap="flat" cmpd="sng" algn="ctr">
-                      <a:solidFill>
-                        <a:schemeClr val="bg2"/>
-                      </a:solidFill>
-                      <a:prstDash val="solid"/>
-                      <a:round/>
-                      <a:headEnd type="none" w="med" len="med"/>
-                      <a:tailEnd type="none" w="med" len="med"/>
-                    </a:lnR>
-                    <a:lnT w="38100" cap="flat" cmpd="sng" algn="ctr">
-                      <a:solidFill>
-                        <a:schemeClr val="bg2"/>
-                      </a:solidFill>
-                      <a:prstDash val="solid"/>
-                      <a:round/>
-                      <a:headEnd type="none" w="med" len="med"/>
-                      <a:tailEnd type="none" w="med" len="med"/>
-                    </a:lnT>
-                    <a:lnB w="38100" cap="flat" cmpd="sng" algn="ctr">
-                      <a:solidFill>
-                        <a:schemeClr val="bg2"/>
-                      </a:solidFill>
-                      <a:prstDash val="solid"/>
-                      <a:round/>
-                      <a:headEnd type="none" w="med" len="med"/>
-                      <a:tailEnd type="none" w="med" len="med"/>
-                    </a:lnB>
-                    <a:lnTlToBr w="12700" cmpd="sng">
-                      <a:noFill/>
-                      <a:prstDash val="solid"/>
-                    </a:lnTlToBr>
-                    <a:lnBlToTr w="12700" cmpd="sng">
-                      <a:noFill/>
-                      <a:prstDash val="solid"/>
-                    </a:lnBlToTr>
-                    <a:solidFill>
-                      <a:schemeClr val="bg1"/>
-                    </a:solidFill>
-                  </a:tcPr>
-                </a:tc>
-                <a:extLst>
-                  <a:ext uri="{0D108BD9-81ED-4DB2-BD59-A6C34878D82A}">
-                    <a16:rowId xmlns:a16="http://schemas.microsoft.com/office/drawing/2014/main" val="795213843"/>
-                  </a:ext>
-                </a:extLst>
-              </a:tr>
-            </a:tbl>
-          </a:graphicData>
-        </a:graphic>
-      </p:graphicFrame>
-      <p:sp>
-        <p:nvSpPr>
-          <p:cNvPr id="2" name="Title 1">
-            <a:extLst>
-              <a:ext uri="{FF2B5EF4-FFF2-40B4-BE49-F238E27FC236}">
-                <a16:creationId xmlns:a16="http://schemas.microsoft.com/office/drawing/2014/main" id="{6E6C211C-B030-4641-BF61-E4F3EC3D9C5A}"/>
-              </a:ext>
-            </a:extLst>
-          </p:cNvPr>
-          <p:cNvSpPr>
-            <a:spLocks noGrp="1"/>
-          </p:cNvSpPr>
-          <p:nvPr>
-            <p:ph type="title"/>
-          </p:nvPr>
-        </p:nvSpPr>
-        <p:spPr/>
-        <p:txBody>
-          <a:bodyPr/>
-          <a:lstStyle/>
-          <a:p>
-            <a:r>
-              <a:rPr lang="en-US" dirty="0"/>
-              <a:t>Actions</a:t>
-            </a:r>
-          </a:p>
-        </p:txBody>
-      </p:sp>
-    </p:spTree>
-    <p:extLst>
-      <p:ext uri="{BB962C8B-B14F-4D97-AF65-F5344CB8AC3E}">
-        <p14:creationId xmlns:p14="http://schemas.microsoft.com/office/powerpoint/2010/main" val="3418531550"/>
-      </p:ext>
-    </p:extLst>
-  </p:cSld>
-  <p:clrMapOvr>
-    <a:masterClrMapping/>
-  </p:clrMapOvr>
-  <p:transition>
-    <p:fade/>
-  </p:transition>
-</p:sld>
-</file>
-
-<file path=ppt/slides/slide7.xml><?xml version="1.0" encoding="utf-8"?>
 <p:sld xmlns:a="http://schemas.openxmlformats.org/drawingml/2006/main" xmlns:r="http://schemas.openxmlformats.org/officeDocument/2006/relationships" xmlns:p="http://schemas.openxmlformats.org/presentationml/2006/main">
   <p:cSld>
     <p:spTree>
@@ -17133,7 +15684,7 @@
 </p:sld>
 </file>
 
-<file path=ppt/slides/slide8.xml><?xml version="1.0" encoding="utf-8"?>
+<file path=ppt/slides/slide7.xml><?xml version="1.0" encoding="utf-8"?>
 <p:sld xmlns:a="http://schemas.openxmlformats.org/drawingml/2006/main" xmlns:r="http://schemas.openxmlformats.org/officeDocument/2006/relationships" xmlns:p="http://schemas.openxmlformats.org/presentationml/2006/main">
   <p:cSld>
     <p:spTree>
@@ -17658,7 +16209,7 @@
 </p:sld>
 </file>
 
-<file path=ppt/slides/slide9.xml><?xml version="1.0" encoding="utf-8"?>
+<file path=ppt/slides/slide8.xml><?xml version="1.0" encoding="utf-8"?>
 <p:sld xmlns:a="http://schemas.openxmlformats.org/drawingml/2006/main" xmlns:r="http://schemas.openxmlformats.org/officeDocument/2006/relationships" xmlns:p="http://schemas.openxmlformats.org/presentationml/2006/main">
   <p:cSld>
     <p:spTree>
@@ -17701,6 +16252,358 @@
     <p:extLst>
       <p:ext uri="{BB962C8B-B14F-4D97-AF65-F5344CB8AC3E}">
         <p14:creationId xmlns:p14="http://schemas.microsoft.com/office/powerpoint/2010/main" val="2913580386"/>
+      </p:ext>
+    </p:extLst>
+  </p:cSld>
+  <p:clrMapOvr>
+    <a:masterClrMapping/>
+  </p:clrMapOvr>
+  <p:transition>
+    <p:fade/>
+  </p:transition>
+</p:sld>
+</file>
+
+<file path=ppt/slides/slide9.xml><?xml version="1.0" encoding="utf-8"?>
+<p:sld xmlns:a="http://schemas.openxmlformats.org/drawingml/2006/main" xmlns:r="http://schemas.openxmlformats.org/officeDocument/2006/relationships" xmlns:p="http://schemas.openxmlformats.org/presentationml/2006/main">
+  <p:cSld>
+    <p:spTree>
+      <p:nvGrpSpPr>
+        <p:cNvPr id="1" name=""/>
+        <p:cNvGrpSpPr/>
+        <p:nvPr/>
+      </p:nvGrpSpPr>
+      <p:grpSpPr>
+        <a:xfrm>
+          <a:off x="0" y="0"/>
+          <a:ext cx="0" cy="0"/>
+          <a:chOff x="0" y="0"/>
+          <a:chExt cx="0" cy="0"/>
+        </a:xfrm>
+      </p:grpSpPr>
+      <p:pic>
+        <p:nvPicPr>
+          <p:cNvPr id="3" name="Picture 2">
+            <a:extLst>
+              <a:ext uri="{FF2B5EF4-FFF2-40B4-BE49-F238E27FC236}">
+                <a16:creationId xmlns:a16="http://schemas.microsoft.com/office/drawing/2014/main" id="{EE215EA7-7174-487D-949C-048DC5016E47}"/>
+              </a:ext>
+            </a:extLst>
+          </p:cNvPr>
+          <p:cNvPicPr>
+            <a:picLocks noChangeAspect="1"/>
+          </p:cNvPicPr>
+          <p:nvPr/>
+        </p:nvPicPr>
+        <p:blipFill rotWithShape="1">
+          <a:blip r:embed="rId2" cstate="screen">
+            <a:extLst>
+              <a:ext uri="{28A0092B-C50C-407E-A947-70E740481C1C}">
+                <a14:useLocalDpi xmlns:a14="http://schemas.microsoft.com/office/drawing/2010/main"/>
+              </a:ext>
+            </a:extLst>
+          </a:blip>
+          <a:srcRect l="27426" r="10166"/>
+          <a:stretch/>
+        </p:blipFill>
+        <p:spPr>
+          <a:xfrm>
+            <a:off x="5887091" y="0"/>
+            <a:ext cx="6549384" cy="6994525"/>
+          </a:xfrm>
+          <a:prstGeom prst="rect">
+            <a:avLst/>
+          </a:prstGeom>
+        </p:spPr>
+      </p:pic>
+      <p:sp>
+        <p:nvSpPr>
+          <p:cNvPr id="4" name="Title 3">
+            <a:extLst>
+              <a:ext uri="{FF2B5EF4-FFF2-40B4-BE49-F238E27FC236}">
+                <a16:creationId xmlns:a16="http://schemas.microsoft.com/office/drawing/2014/main" id="{8047349F-0B8F-4D12-A39C-718C1C57DDFF}"/>
+              </a:ext>
+            </a:extLst>
+          </p:cNvPr>
+          <p:cNvSpPr>
+            <a:spLocks noGrp="1"/>
+          </p:cNvSpPr>
+          <p:nvPr>
+            <p:ph type="title"/>
+          </p:nvPr>
+        </p:nvSpPr>
+        <p:spPr>
+          <a:xfrm>
+            <a:off x="454864" y="1843063"/>
+            <a:ext cx="11533187" cy="411162"/>
+          </a:xfrm>
+        </p:spPr>
+        <p:txBody>
+          <a:bodyPr/>
+          <a:lstStyle/>
+          <a:p>
+            <a:r>
+              <a:rPr lang="en-US" dirty="0"/>
+              <a:t>Summary</a:t>
+            </a:r>
+          </a:p>
+        </p:txBody>
+      </p:sp>
+      <p:sp>
+        <p:nvSpPr>
+          <p:cNvPr id="10" name="Text Placeholder 6">
+            <a:extLst>
+              <a:ext uri="{FF2B5EF4-FFF2-40B4-BE49-F238E27FC236}">
+                <a16:creationId xmlns:a16="http://schemas.microsoft.com/office/drawing/2014/main" id="{61D48218-75E0-4C6C-BFA7-A1010BADED35}"/>
+              </a:ext>
+            </a:extLst>
+          </p:cNvPr>
+          <p:cNvSpPr txBox="1">
+            <a:spLocks/>
+          </p:cNvSpPr>
+          <p:nvPr/>
+        </p:nvSpPr>
+        <p:spPr>
+          <a:xfrm>
+            <a:off x="465139" y="2621905"/>
+            <a:ext cx="4234184" cy="221599"/>
+          </a:xfrm>
+          <a:prstGeom prst="rect">
+            <a:avLst/>
+          </a:prstGeom>
+        </p:spPr>
+        <p:txBody>
+          <a:bodyPr vert="horz" wrap="square" lIns="0" tIns="0" rIns="0" bIns="0" rtlCol="0">
+            <a:spAutoFit/>
+          </a:bodyPr>
+          <a:lstStyle>
+            <a:lvl1pPr marL="0" marR="0" indent="0" algn="l" defTabSz="932742" rtl="0" eaLnBrk="1" fontAlgn="auto" latinLnBrk="0" hangingPunct="1">
+              <a:lnSpc>
+                <a:spcPts val="1800"/>
+              </a:lnSpc>
+              <a:spcBef>
+                <a:spcPts val="0"/>
+              </a:spcBef>
+              <a:spcAft>
+                <a:spcPts val="0"/>
+              </a:spcAft>
+              <a:buClrTx/>
+              <a:buSzPct val="90000"/>
+              <a:buFont typeface="Wingdings" panose="05000000000000000000" pitchFamily="2" charset="2"/>
+              <a:buNone/>
+              <a:tabLst/>
+              <a:defRPr sz="1400" b="1" kern="1200" spc="0" baseline="0">
+                <a:solidFill>
+                  <a:schemeClr val="tx1"/>
+                </a:solidFill>
+                <a:latin typeface="+mn-lt"/>
+                <a:ea typeface="+mn-ea"/>
+                <a:cs typeface="+mn-cs"/>
+              </a:defRPr>
+            </a:lvl1pPr>
+            <a:lvl2pPr marL="0" marR="0" indent="0" algn="l" defTabSz="932742" rtl="0" eaLnBrk="1" fontAlgn="auto" latinLnBrk="0" hangingPunct="1">
+              <a:lnSpc>
+                <a:spcPts val="1800"/>
+              </a:lnSpc>
+              <a:spcBef>
+                <a:spcPts val="0"/>
+              </a:spcBef>
+              <a:spcAft>
+                <a:spcPts val="0"/>
+              </a:spcAft>
+              <a:buClrTx/>
+              <a:buSzPct val="90000"/>
+              <a:buFont typeface="Wingdings" panose="05000000000000000000" pitchFamily="2" charset="2"/>
+              <a:buNone/>
+              <a:tabLst/>
+              <a:defRPr sz="1400" kern="1200" spc="0" baseline="0">
+                <a:solidFill>
+                  <a:schemeClr val="tx1"/>
+                </a:solidFill>
+                <a:latin typeface="+mn-lt"/>
+                <a:ea typeface="+mn-ea"/>
+                <a:cs typeface="+mn-cs"/>
+              </a:defRPr>
+            </a:lvl2pPr>
+            <a:lvl3pPr marL="457200" marR="0" indent="0" algn="l" defTabSz="932742" rtl="0" eaLnBrk="1" fontAlgn="auto" latinLnBrk="0" hangingPunct="1">
+              <a:lnSpc>
+                <a:spcPct val="90000"/>
+              </a:lnSpc>
+              <a:spcBef>
+                <a:spcPct val="20000"/>
+              </a:spcBef>
+              <a:spcAft>
+                <a:spcPts val="0"/>
+              </a:spcAft>
+              <a:buClrTx/>
+              <a:buSzPct val="90000"/>
+              <a:buFont typeface="Wingdings" panose="05000000000000000000" pitchFamily="2" charset="2"/>
+              <a:buNone/>
+              <a:tabLst/>
+              <a:defRPr sz="2400" kern="1200" spc="0" baseline="0">
+                <a:gradFill>
+                  <a:gsLst>
+                    <a:gs pos="1250">
+                      <a:schemeClr val="tx1"/>
+                    </a:gs>
+                    <a:gs pos="100000">
+                      <a:schemeClr val="tx1"/>
+                    </a:gs>
+                  </a:gsLst>
+                  <a:lin ang="5400000" scaled="0"/>
+                </a:gradFill>
+                <a:latin typeface="+mn-lt"/>
+                <a:ea typeface="+mn-ea"/>
+                <a:cs typeface="+mn-cs"/>
+              </a:defRPr>
+            </a:lvl3pPr>
+            <a:lvl4pPr marL="685800" marR="0" indent="0" algn="l" defTabSz="932742" rtl="0" eaLnBrk="1" fontAlgn="auto" latinLnBrk="0" hangingPunct="1">
+              <a:lnSpc>
+                <a:spcPct val="90000"/>
+              </a:lnSpc>
+              <a:spcBef>
+                <a:spcPct val="20000"/>
+              </a:spcBef>
+              <a:spcAft>
+                <a:spcPts val="0"/>
+              </a:spcAft>
+              <a:buClrTx/>
+              <a:buSzPct val="90000"/>
+              <a:buFont typeface="Wingdings" panose="05000000000000000000" pitchFamily="2" charset="2"/>
+              <a:buNone/>
+              <a:tabLst/>
+              <a:defRPr sz="2200" kern="1200" spc="0" baseline="0">
+                <a:gradFill>
+                  <a:gsLst>
+                    <a:gs pos="1250">
+                      <a:schemeClr val="tx1"/>
+                    </a:gs>
+                    <a:gs pos="100000">
+                      <a:schemeClr val="tx1"/>
+                    </a:gs>
+                  </a:gsLst>
+                  <a:lin ang="5400000" scaled="0"/>
+                </a:gradFill>
+                <a:latin typeface="+mn-lt"/>
+                <a:ea typeface="+mn-ea"/>
+                <a:cs typeface="+mn-cs"/>
+              </a:defRPr>
+            </a:lvl4pPr>
+            <a:lvl5pPr marL="914400" marR="0" indent="0" algn="l" defTabSz="932742" rtl="0" eaLnBrk="1" fontAlgn="auto" latinLnBrk="0" hangingPunct="1">
+              <a:lnSpc>
+                <a:spcPct val="90000"/>
+              </a:lnSpc>
+              <a:spcBef>
+                <a:spcPct val="20000"/>
+              </a:spcBef>
+              <a:spcAft>
+                <a:spcPts val="0"/>
+              </a:spcAft>
+              <a:buClrTx/>
+              <a:buSzPct val="90000"/>
+              <a:buFont typeface="Wingdings" panose="05000000000000000000" pitchFamily="2" charset="2"/>
+              <a:buNone/>
+              <a:tabLst/>
+              <a:defRPr sz="2200" kern="1200" spc="0" baseline="0">
+                <a:gradFill>
+                  <a:gsLst>
+                    <a:gs pos="1250">
+                      <a:schemeClr val="tx1"/>
+                    </a:gs>
+                    <a:gs pos="100000">
+                      <a:schemeClr val="tx1"/>
+                    </a:gs>
+                  </a:gsLst>
+                  <a:lin ang="5400000" scaled="0"/>
+                </a:gradFill>
+                <a:latin typeface="+mn-lt"/>
+                <a:ea typeface="+mn-ea"/>
+                <a:cs typeface="+mn-cs"/>
+              </a:defRPr>
+            </a:lvl5pPr>
+            <a:lvl6pPr marL="2565040" indent="-233186" algn="l" defTabSz="932742" rtl="0" eaLnBrk="1" latinLnBrk="0" hangingPunct="1">
+              <a:spcBef>
+                <a:spcPct val="20000"/>
+              </a:spcBef>
+              <a:buFont typeface="Arial" pitchFamily="34" charset="0"/>
+              <a:buChar char="•"/>
+              <a:defRPr sz="2000" kern="1200">
+                <a:solidFill>
+                  <a:schemeClr val="tx1"/>
+                </a:solidFill>
+                <a:latin typeface="+mn-lt"/>
+                <a:ea typeface="+mn-ea"/>
+                <a:cs typeface="+mn-cs"/>
+              </a:defRPr>
+            </a:lvl6pPr>
+            <a:lvl7pPr marL="3031412" indent="-233186" algn="l" defTabSz="932742" rtl="0" eaLnBrk="1" latinLnBrk="0" hangingPunct="1">
+              <a:spcBef>
+                <a:spcPct val="20000"/>
+              </a:spcBef>
+              <a:buFont typeface="Arial" pitchFamily="34" charset="0"/>
+              <a:buChar char="•"/>
+              <a:defRPr sz="2000" kern="1200">
+                <a:solidFill>
+                  <a:schemeClr val="tx1"/>
+                </a:solidFill>
+                <a:latin typeface="+mn-lt"/>
+                <a:ea typeface="+mn-ea"/>
+                <a:cs typeface="+mn-cs"/>
+              </a:defRPr>
+            </a:lvl7pPr>
+            <a:lvl8pPr marL="3497783" indent="-233186" algn="l" defTabSz="932742" rtl="0" eaLnBrk="1" latinLnBrk="0" hangingPunct="1">
+              <a:spcBef>
+                <a:spcPct val="20000"/>
+              </a:spcBef>
+              <a:buFont typeface="Arial" pitchFamily="34" charset="0"/>
+              <a:buChar char="•"/>
+              <a:defRPr sz="2000" kern="1200">
+                <a:solidFill>
+                  <a:schemeClr val="tx1"/>
+                </a:solidFill>
+                <a:latin typeface="+mn-lt"/>
+                <a:ea typeface="+mn-ea"/>
+                <a:cs typeface="+mn-cs"/>
+              </a:defRPr>
+            </a:lvl8pPr>
+            <a:lvl9pPr marL="3964155" indent="-233186" algn="l" defTabSz="932742" rtl="0" eaLnBrk="1" latinLnBrk="0" hangingPunct="1">
+              <a:spcBef>
+                <a:spcPct val="20000"/>
+              </a:spcBef>
+              <a:buFont typeface="Arial" pitchFamily="34" charset="0"/>
+              <a:buChar char="•"/>
+              <a:defRPr sz="2000" kern="1200">
+                <a:solidFill>
+                  <a:schemeClr val="tx1"/>
+                </a:solidFill>
+                <a:latin typeface="+mn-lt"/>
+                <a:ea typeface="+mn-ea"/>
+                <a:cs typeface="+mn-cs"/>
+              </a:defRPr>
+            </a:lvl9pPr>
+          </a:lstStyle>
+          <a:p>
+            <a:pPr lvl="0">
+              <a:lnSpc>
+                <a:spcPct val="90000"/>
+              </a:lnSpc>
+              <a:spcBef>
+                <a:spcPts val="1800"/>
+              </a:spcBef>
+            </a:pPr>
+            <a:endParaRPr lang="en-US" sz="1600" b="0" dirty="0">
+              <a:solidFill>
+                <a:srgbClr val="2F2F2F"/>
+              </a:solidFill>
+              <a:latin typeface="Segoe UI Semibold"/>
+            </a:endParaRPr>
+          </a:p>
+        </p:txBody>
+      </p:sp>
+    </p:spTree>
+    <p:extLst>
+      <p:ext uri="{BB962C8B-B14F-4D97-AF65-F5344CB8AC3E}">
+        <p14:creationId xmlns:p14="http://schemas.microsoft.com/office/powerpoint/2010/main" val="3651672785"/>
       </p:ext>
     </p:extLst>
   </p:cSld>

</xml_diff>